<commit_message>
code section added to the file
</commit_message>
<xml_diff>
--- a/OS_Project/FCFS.pptx
+++ b/OS_Project/FCFS.pptx
@@ -5,10 +5,10 @@
     <p:sldMasterId id="2147483648" r:id="rId4"/>
   </p:sldMasterIdLst>
   <p:notesMasterIdLst>
-    <p:notesMasterId r:id="rId16"/>
+    <p:notesMasterId r:id="rId17"/>
   </p:notesMasterIdLst>
   <p:handoutMasterIdLst>
-    <p:handoutMasterId r:id="rId17"/>
+    <p:handoutMasterId r:id="rId18"/>
   </p:handoutMasterIdLst>
   <p:sldIdLst>
     <p:sldId id="342" r:id="rId5"/>
@@ -18,10 +18,11 @@
     <p:sldId id="374" r:id="rId9"/>
     <p:sldId id="375" r:id="rId10"/>
     <p:sldId id="365" r:id="rId11"/>
-    <p:sldId id="383" r:id="rId12"/>
-    <p:sldId id="376" r:id="rId13"/>
-    <p:sldId id="377" r:id="rId14"/>
-    <p:sldId id="372" r:id="rId15"/>
+    <p:sldId id="384" r:id="rId12"/>
+    <p:sldId id="383" r:id="rId13"/>
+    <p:sldId id="376" r:id="rId14"/>
+    <p:sldId id="377" r:id="rId15"/>
+    <p:sldId id="372" r:id="rId16"/>
   </p:sldIdLst>
   <p:sldSz cx="12192000" cy="6858000"/>
   <p:notesSz cx="6858000" cy="9144000"/>
@@ -835,7 +836,7 @@
           <a:p>
             <a:fld id="{DEF75CB5-5666-5049-9AE0-38EFD385C21E}" type="slidenum">
               <a:rPr lang="en-US" smtClean="0"/>
-              <a:t>11</a:t>
+              <a:t>12</a:t>
             </a:fld>
             <a:endParaRPr lang="en-US" dirty="0"/>
           </a:p>
@@ -1483,7 +1484,7 @@
           <a:p>
             <a:fld id="{DEF75CB5-5666-5049-9AE0-38EFD385C21E}" type="slidenum">
               <a:rPr lang="en-US" smtClean="0"/>
-              <a:t>8</a:t>
+              <a:t>9</a:t>
             </a:fld>
             <a:endParaRPr lang="en-US" dirty="0"/>
           </a:p>
@@ -1567,7 +1568,7 @@
           <a:p>
             <a:fld id="{DEF75CB5-5666-5049-9AE0-38EFD385C21E}" type="slidenum">
               <a:rPr lang="en-US" smtClean="0"/>
-              <a:t>9</a:t>
+              <a:t>10</a:t>
             </a:fld>
             <a:endParaRPr lang="en-US" dirty="0"/>
           </a:p>
@@ -1651,7 +1652,7 @@
           <a:p>
             <a:fld id="{DEF75CB5-5666-5049-9AE0-38EFD385C21E}" type="slidenum">
               <a:rPr lang="en-US" smtClean="0"/>
-              <a:t>10</a:t>
+              <a:t>11</a:t>
             </a:fld>
             <a:endParaRPr lang="en-US" dirty="0"/>
           </a:p>
@@ -10460,6 +10461,466 @@
       </p:grpSpPr>
       <p:sp>
         <p:nvSpPr>
+          <p:cNvPr id="3" name="Content Placeholder 2">
+            <a:extLst>
+              <a:ext uri="{FF2B5EF4-FFF2-40B4-BE49-F238E27FC236}">
+                <a16:creationId xmlns:a16="http://schemas.microsoft.com/office/drawing/2014/main" id="{F09FEE91-E849-1CB0-9E51-A58B99C631C5}"/>
+              </a:ext>
+            </a:extLst>
+          </p:cNvPr>
+          <p:cNvSpPr>
+            <a:spLocks noGrp="1"/>
+          </p:cNvSpPr>
+          <p:nvPr>
+            <p:ph sz="quarter" idx="35"/>
+          </p:nvPr>
+        </p:nvSpPr>
+        <p:spPr>
+          <a:xfrm>
+            <a:off x="2252542" y="2302283"/>
+            <a:ext cx="4015098" cy="3528397"/>
+          </a:xfrm>
+        </p:spPr>
+        <p:txBody>
+          <a:bodyPr/>
+          <a:lstStyle/>
+          <a:p>
+            <a:r>
+              <a:rPr lang="en-US" sz="2400" dirty="0">
+                <a:solidFill>
+                  <a:schemeClr val="tx2"/>
+                </a:solidFill>
+              </a:rPr>
+              <a:t>Advantages:</a:t>
+            </a:r>
+          </a:p>
+          <a:p>
+            <a:pPr marL="285750" indent="-285750">
+              <a:buFont typeface="Arial" panose="020B0604020202020204" pitchFamily="34" charset="0"/>
+              <a:buChar char="•"/>
+            </a:pPr>
+            <a:r>
+              <a:rPr lang="en-US" dirty="0"/>
+              <a:t>Simplicity: FCFS is easy to implement and understand.</a:t>
+            </a:r>
+          </a:p>
+          <a:p>
+            <a:pPr marL="285750" indent="-285750">
+              <a:buFont typeface="Arial" panose="020B0604020202020204" pitchFamily="34" charset="0"/>
+              <a:buChar char="•"/>
+            </a:pPr>
+            <a:r>
+              <a:rPr lang="en-US" dirty="0"/>
+              <a:t>Predictable: The order of process execution is predictable.</a:t>
+            </a:r>
+          </a:p>
+        </p:txBody>
+      </p:sp>
+      <p:sp>
+        <p:nvSpPr>
+          <p:cNvPr id="4" name="Content Placeholder 3">
+            <a:extLst>
+              <a:ext uri="{FF2B5EF4-FFF2-40B4-BE49-F238E27FC236}">
+                <a16:creationId xmlns:a16="http://schemas.microsoft.com/office/drawing/2014/main" id="{9B774F1A-D233-C240-B22D-F82C6161FAC1}"/>
+              </a:ext>
+            </a:extLst>
+          </p:cNvPr>
+          <p:cNvSpPr>
+            <a:spLocks noGrp="1"/>
+          </p:cNvSpPr>
+          <p:nvPr>
+            <p:ph sz="quarter" idx="36"/>
+          </p:nvPr>
+        </p:nvSpPr>
+        <p:spPr>
+          <a:xfrm>
+            <a:off x="6995159" y="2327192"/>
+            <a:ext cx="4227332" cy="3951868"/>
+          </a:xfrm>
+        </p:spPr>
+        <p:txBody>
+          <a:bodyPr/>
+          <a:lstStyle/>
+          <a:p>
+            <a:r>
+              <a:rPr lang="en-US" sz="2400" dirty="0">
+                <a:solidFill>
+                  <a:schemeClr val="tx2"/>
+                </a:solidFill>
+              </a:rPr>
+              <a:t>Disadvantages</a:t>
+            </a:r>
+            <a:r>
+              <a:rPr lang="en-US" sz="2000" b="1" dirty="0">
+                <a:solidFill>
+                  <a:schemeClr val="tx2"/>
+                </a:solidFill>
+              </a:rPr>
+              <a:t>:</a:t>
+            </a:r>
+          </a:p>
+          <a:p>
+            <a:pPr marL="285750" indent="-285750">
+              <a:buFont typeface="Arial" panose="020B0604020202020204" pitchFamily="34" charset="0"/>
+              <a:buChar char="•"/>
+            </a:pPr>
+            <a:r>
+              <a:rPr lang="en-US" dirty="0"/>
+              <a:t>Convoy Effect: A long process can delay many shorter processes, leading to increased waiting times.</a:t>
+            </a:r>
+          </a:p>
+          <a:p>
+            <a:pPr marL="285750" indent="-285750">
+              <a:buFont typeface="Arial" panose="020B0604020202020204" pitchFamily="34" charset="0"/>
+              <a:buChar char="•"/>
+            </a:pPr>
+            <a:r>
+              <a:rPr lang="en-US" dirty="0"/>
+              <a:t>Poor Average Waiting Time: High average waiting time when there is significant variation in burst times.</a:t>
+            </a:r>
+          </a:p>
+          <a:p>
+            <a:pPr marL="285750" indent="-285750">
+              <a:buFont typeface="Arial" panose="020B0604020202020204" pitchFamily="34" charset="0"/>
+              <a:buChar char="•"/>
+            </a:pPr>
+            <a:r>
+              <a:rPr lang="en-US" dirty="0"/>
+              <a:t>Non-Preemptive: Inefficient for time-sharing systems where response time is crucial</a:t>
+            </a:r>
+          </a:p>
+          <a:p>
+            <a:pPr lvl="1"/>
+            <a:endParaRPr lang="en-US" dirty="0"/>
+          </a:p>
+        </p:txBody>
+      </p:sp>
+      <p:sp>
+        <p:nvSpPr>
+          <p:cNvPr id="5" name="Slide Number Placeholder 4">
+            <a:extLst>
+              <a:ext uri="{FF2B5EF4-FFF2-40B4-BE49-F238E27FC236}">
+                <a16:creationId xmlns:a16="http://schemas.microsoft.com/office/drawing/2014/main" id="{23E23533-91C6-420C-B7D7-4977ACF73ACF}"/>
+              </a:ext>
+            </a:extLst>
+          </p:cNvPr>
+          <p:cNvSpPr>
+            <a:spLocks noGrp="1"/>
+          </p:cNvSpPr>
+          <p:nvPr>
+            <p:ph type="sldNum" sz="quarter" idx="12"/>
+          </p:nvPr>
+        </p:nvSpPr>
+        <p:spPr>
+          <a:xfrm>
+            <a:off x="9140971" y="6226198"/>
+            <a:ext cx="2743200" cy="365125"/>
+          </a:xfrm>
+        </p:spPr>
+        <p:txBody>
+          <a:bodyPr/>
+          <a:lstStyle/>
+          <a:p>
+            <a:fld id="{FE024F78-56A6-7740-B68D-8D4D026EDF3F}" type="slidenum">
+              <a:rPr lang="en-US" smtClean="0"/>
+              <a:pPr/>
+              <a:t>10</a:t>
+            </a:fld>
+            <a:endParaRPr lang="en-US" dirty="0"/>
+          </a:p>
+        </p:txBody>
+      </p:sp>
+      <p:sp>
+        <p:nvSpPr>
+          <p:cNvPr id="8" name="Subtitle 4">
+            <a:extLst>
+              <a:ext uri="{FF2B5EF4-FFF2-40B4-BE49-F238E27FC236}">
+                <a16:creationId xmlns:a16="http://schemas.microsoft.com/office/drawing/2014/main" id="{64C2F3A9-ACD4-95DF-7B87-86B79D5D329F}"/>
+              </a:ext>
+            </a:extLst>
+          </p:cNvPr>
+          <p:cNvSpPr txBox="1">
+            <a:spLocks/>
+          </p:cNvSpPr>
+          <p:nvPr/>
+        </p:nvSpPr>
+        <p:spPr>
+          <a:xfrm>
+            <a:off x="2252542" y="1434131"/>
+            <a:ext cx="5853413" cy="640757"/>
+          </a:xfrm>
+          <a:prstGeom prst="rect">
+            <a:avLst/>
+          </a:prstGeom>
+        </p:spPr>
+        <p:txBody>
+          <a:bodyPr/>
+          <a:lstStyle>
+            <a:lvl1pPr marL="0" indent="0" algn="l" defTabSz="914400" rtl="0" eaLnBrk="1" latinLnBrk="0" hangingPunct="1">
+              <a:lnSpc>
+                <a:spcPct val="90000"/>
+              </a:lnSpc>
+              <a:spcBef>
+                <a:spcPts val="1000"/>
+              </a:spcBef>
+              <a:buFont typeface="Arial" panose="020B0604020202020204" pitchFamily="34" charset="0"/>
+              <a:buNone/>
+              <a:defRPr sz="2800" kern="1200">
+                <a:solidFill>
+                  <a:schemeClr val="accent3"/>
+                </a:solidFill>
+                <a:latin typeface="+mj-lt"/>
+                <a:ea typeface="+mn-ea"/>
+                <a:cs typeface="Biome" panose="020B0503030204020804" pitchFamily="34" charset="0"/>
+              </a:defRPr>
+            </a:lvl1pPr>
+            <a:lvl2pPr marL="800100" indent="-342900" algn="l" defTabSz="914400" rtl="0" eaLnBrk="1" latinLnBrk="0" hangingPunct="1">
+              <a:lnSpc>
+                <a:spcPct val="90000"/>
+              </a:lnSpc>
+              <a:spcBef>
+                <a:spcPts val="500"/>
+              </a:spcBef>
+              <a:buClr>
+                <a:schemeClr val="accent6"/>
+              </a:buClr>
+              <a:buFont typeface="Arial" panose="020B0604020202020204" pitchFamily="34" charset="0"/>
+              <a:buChar char="•"/>
+              <a:defRPr sz="2400" kern="1200">
+                <a:solidFill>
+                  <a:schemeClr val="bg1"/>
+                </a:solidFill>
+                <a:latin typeface="+mn-lt"/>
+                <a:ea typeface="+mn-ea"/>
+                <a:cs typeface="+mn-cs"/>
+              </a:defRPr>
+            </a:lvl2pPr>
+            <a:lvl3pPr marL="1257300" indent="-342900" algn="l" defTabSz="914400" rtl="0" eaLnBrk="1" latinLnBrk="0" hangingPunct="1">
+              <a:lnSpc>
+                <a:spcPct val="90000"/>
+              </a:lnSpc>
+              <a:spcBef>
+                <a:spcPts val="500"/>
+              </a:spcBef>
+              <a:buClr>
+                <a:schemeClr val="accent6"/>
+              </a:buClr>
+              <a:buFont typeface="Arial" panose="020B0604020202020204" pitchFamily="34" charset="0"/>
+              <a:buChar char="•"/>
+              <a:defRPr sz="2000" kern="1200">
+                <a:solidFill>
+                  <a:schemeClr val="bg1"/>
+                </a:solidFill>
+                <a:latin typeface="+mn-lt"/>
+                <a:ea typeface="+mn-ea"/>
+                <a:cs typeface="+mn-cs"/>
+              </a:defRPr>
+            </a:lvl3pPr>
+            <a:lvl4pPr marL="1657350" indent="-285750" algn="l" defTabSz="914400" rtl="0" eaLnBrk="1" latinLnBrk="0" hangingPunct="1">
+              <a:lnSpc>
+                <a:spcPct val="90000"/>
+              </a:lnSpc>
+              <a:spcBef>
+                <a:spcPts val="500"/>
+              </a:spcBef>
+              <a:buClr>
+                <a:schemeClr val="accent6"/>
+              </a:buClr>
+              <a:buFont typeface="Arial" panose="020B0604020202020204" pitchFamily="34" charset="0"/>
+              <a:buChar char="•"/>
+              <a:defRPr sz="1800" kern="1200">
+                <a:solidFill>
+                  <a:schemeClr val="bg1"/>
+                </a:solidFill>
+                <a:latin typeface="+mn-lt"/>
+                <a:ea typeface="+mn-ea"/>
+                <a:cs typeface="+mn-cs"/>
+              </a:defRPr>
+            </a:lvl4pPr>
+            <a:lvl5pPr marL="2114550" indent="-285750" algn="l" defTabSz="914400" rtl="0" eaLnBrk="1" latinLnBrk="0" hangingPunct="1">
+              <a:lnSpc>
+                <a:spcPct val="90000"/>
+              </a:lnSpc>
+              <a:spcBef>
+                <a:spcPts val="500"/>
+              </a:spcBef>
+              <a:buClr>
+                <a:schemeClr val="accent6"/>
+              </a:buClr>
+              <a:buFont typeface="Arial" panose="020B0604020202020204" pitchFamily="34" charset="0"/>
+              <a:buChar char="•"/>
+              <a:defRPr sz="1800" kern="1200">
+                <a:solidFill>
+                  <a:schemeClr val="bg1"/>
+                </a:solidFill>
+                <a:latin typeface="+mn-lt"/>
+                <a:ea typeface="+mn-ea"/>
+                <a:cs typeface="+mn-cs"/>
+              </a:defRPr>
+            </a:lvl5pPr>
+            <a:lvl6pPr marL="2514600" indent="-228600" algn="l" defTabSz="914400" rtl="0" eaLnBrk="1" latinLnBrk="0" hangingPunct="1">
+              <a:lnSpc>
+                <a:spcPct val="90000"/>
+              </a:lnSpc>
+              <a:spcBef>
+                <a:spcPts val="500"/>
+              </a:spcBef>
+              <a:buFont typeface="Arial" panose="020B0604020202020204" pitchFamily="34" charset="0"/>
+              <a:buChar char="•"/>
+              <a:defRPr sz="1800" kern="1200">
+                <a:solidFill>
+                  <a:schemeClr val="tx1"/>
+                </a:solidFill>
+                <a:latin typeface="+mn-lt"/>
+                <a:ea typeface="+mn-ea"/>
+                <a:cs typeface="+mn-cs"/>
+              </a:defRPr>
+            </a:lvl6pPr>
+            <a:lvl7pPr marL="2971800" indent="-228600" algn="l" defTabSz="914400" rtl="0" eaLnBrk="1" latinLnBrk="0" hangingPunct="1">
+              <a:lnSpc>
+                <a:spcPct val="90000"/>
+              </a:lnSpc>
+              <a:spcBef>
+                <a:spcPts val="500"/>
+              </a:spcBef>
+              <a:buFont typeface="Arial" panose="020B0604020202020204" pitchFamily="34" charset="0"/>
+              <a:buChar char="•"/>
+              <a:defRPr sz="1800" kern="1200">
+                <a:solidFill>
+                  <a:schemeClr val="tx1"/>
+                </a:solidFill>
+                <a:latin typeface="+mn-lt"/>
+                <a:ea typeface="+mn-ea"/>
+                <a:cs typeface="+mn-cs"/>
+              </a:defRPr>
+            </a:lvl7pPr>
+            <a:lvl8pPr marL="3429000" indent="-228600" algn="l" defTabSz="914400" rtl="0" eaLnBrk="1" latinLnBrk="0" hangingPunct="1">
+              <a:lnSpc>
+                <a:spcPct val="90000"/>
+              </a:lnSpc>
+              <a:spcBef>
+                <a:spcPts val="500"/>
+              </a:spcBef>
+              <a:buFont typeface="Arial" panose="020B0604020202020204" pitchFamily="34" charset="0"/>
+              <a:buChar char="•"/>
+              <a:defRPr sz="1800" kern="1200">
+                <a:solidFill>
+                  <a:schemeClr val="tx1"/>
+                </a:solidFill>
+                <a:latin typeface="+mn-lt"/>
+                <a:ea typeface="+mn-ea"/>
+                <a:cs typeface="+mn-cs"/>
+              </a:defRPr>
+            </a:lvl8pPr>
+            <a:lvl9pPr marL="3886200" indent="-228600" algn="l" defTabSz="914400" rtl="0" eaLnBrk="1" latinLnBrk="0" hangingPunct="1">
+              <a:lnSpc>
+                <a:spcPct val="90000"/>
+              </a:lnSpc>
+              <a:spcBef>
+                <a:spcPts val="500"/>
+              </a:spcBef>
+              <a:buFont typeface="Arial" panose="020B0604020202020204" pitchFamily="34" charset="0"/>
+              <a:buChar char="•"/>
+              <a:defRPr sz="1800" kern="1200">
+                <a:solidFill>
+                  <a:schemeClr val="tx1"/>
+                </a:solidFill>
+                <a:latin typeface="+mn-lt"/>
+                <a:ea typeface="+mn-ea"/>
+                <a:cs typeface="+mn-cs"/>
+              </a:defRPr>
+            </a:lvl9pPr>
+          </a:lstStyle>
+          <a:p>
+            <a:r>
+              <a:rPr lang="en-US" dirty="0"/>
+              <a:t>Advantages and Disadvantages</a:t>
+            </a:r>
+          </a:p>
+        </p:txBody>
+      </p:sp>
+      <p:sp>
+        <p:nvSpPr>
+          <p:cNvPr id="9" name="Title 1">
+            <a:extLst>
+              <a:ext uri="{FF2B5EF4-FFF2-40B4-BE49-F238E27FC236}">
+                <a16:creationId xmlns:a16="http://schemas.microsoft.com/office/drawing/2014/main" id="{B0FCD022-DA6A-7B0B-B003-A6B7164DD2FD}"/>
+              </a:ext>
+            </a:extLst>
+          </p:cNvPr>
+          <p:cNvSpPr>
+            <a:spLocks noGrp="1"/>
+          </p:cNvSpPr>
+          <p:nvPr>
+            <p:ph type="title"/>
+          </p:nvPr>
+        </p:nvSpPr>
+        <p:spPr>
+          <a:xfrm>
+            <a:off x="2252542" y="-2047773"/>
+            <a:ext cx="7420819" cy="1656304"/>
+          </a:xfrm>
+        </p:spPr>
+        <p:txBody>
+          <a:bodyPr anchor="b">
+            <a:normAutofit/>
+          </a:bodyPr>
+          <a:lstStyle/>
+          <a:p>
+            <a:r>
+              <a:rPr lang="en-US" dirty="0">
+                <a:effectLst/>
+              </a:rPr>
+              <a:t>Conclusion</a:t>
+            </a:r>
+            <a:endParaRPr lang="en-US" dirty="0"/>
+          </a:p>
+        </p:txBody>
+      </p:sp>
+    </p:spTree>
+    <p:extLst>
+      <p:ext uri="{BB962C8B-B14F-4D97-AF65-F5344CB8AC3E}">
+        <p14:creationId xmlns:p14="http://schemas.microsoft.com/office/powerpoint/2010/main" val="1073601555"/>
+      </p:ext>
+    </p:extLst>
+  </p:cSld>
+  <p:clrMapOvr>
+    <a:masterClrMapping/>
+  </p:clrMapOvr>
+  <mc:AlternateContent xmlns:mc="http://schemas.openxmlformats.org/markup-compatibility/2006" xmlns:p159="http://schemas.microsoft.com/office/powerpoint/2015/09/main">
+    <mc:Choice Requires="p159">
+      <p:transition xmlns:p14="http://schemas.microsoft.com/office/powerpoint/2010/main" spd="slow" p14:dur="2000">
+        <p159:morph option="byObject"/>
+      </p:transition>
+    </mc:Choice>
+    <mc:Fallback xmlns="">
+      <p:transition spd="slow">
+        <p:fade/>
+      </p:transition>
+    </mc:Fallback>
+  </mc:AlternateContent>
+</p:sld>
+</file>
+
+<file path=ppt/slides/slide11.xml><?xml version="1.0" encoding="utf-8"?>
+<p:sld xmlns:a="http://schemas.openxmlformats.org/drawingml/2006/main" xmlns:r="http://schemas.openxmlformats.org/officeDocument/2006/relationships" xmlns:p="http://schemas.openxmlformats.org/presentationml/2006/main">
+  <p:cSld>
+    <p:spTree>
+      <p:nvGrpSpPr>
+        <p:cNvPr id="1" name=""/>
+        <p:cNvGrpSpPr/>
+        <p:nvPr/>
+      </p:nvGrpSpPr>
+      <p:grpSpPr>
+        <a:xfrm>
+          <a:off x="0" y="0"/>
+          <a:ext cx="0" cy="0"/>
+          <a:chOff x="0" y="0"/>
+          <a:chExt cx="0" cy="0"/>
+        </a:xfrm>
+      </p:grpSpPr>
+      <p:sp>
+        <p:nvSpPr>
           <p:cNvPr id="2" name="Title 1">
             <a:extLst>
               <a:ext uri="{FF2B5EF4-FFF2-40B4-BE49-F238E27FC236}">
@@ -10578,7 +11039,7 @@
                   <a:spcPts val="600"/>
                 </a:spcAft>
               </a:pPr>
-              <a:t>10</a:t>
+              <a:t>11</a:t>
             </a:fld>
             <a:endParaRPr lang="en-US"/>
           </a:p>
@@ -11245,7 +11706,7 @@
 </p:sld>
 </file>
 
-<file path=ppt/slides/slide11.xml><?xml version="1.0" encoding="utf-8"?>
+<file path=ppt/slides/slide12.xml><?xml version="1.0" encoding="utf-8"?>
 <p:sld xmlns:a="http://schemas.openxmlformats.org/drawingml/2006/main" xmlns:r="http://schemas.openxmlformats.org/officeDocument/2006/relationships" xmlns:p="http://schemas.openxmlformats.org/presentationml/2006/main">
   <p:cSld>
     <p:bg>
@@ -11848,19 +12309,20 @@
           <a:p>
             <a:r>
               <a:rPr lang="en-US" dirty="0"/>
-              <a:t>4. Advantages and Disadvantages </a:t>
+              <a:t>4.Code </a:t>
             </a:r>
           </a:p>
           <a:p>
             <a:r>
               <a:rPr lang="en-US" dirty="0"/>
-              <a:t>5. </a:t>
-            </a:r>
-            <a:r>
-              <a:rPr lang="en-US"/>
-              <a:t>Conclusion </a:t>
-            </a:r>
-            <a:endParaRPr lang="en-US" dirty="0"/>
+              <a:t>5. Advantages and Disadvantages </a:t>
+            </a:r>
+          </a:p>
+          <a:p>
+            <a:r>
+              <a:rPr lang="en-US" dirty="0"/>
+              <a:t>6. Conclusion </a:t>
+            </a:r>
           </a:p>
         </p:txBody>
       </p:sp>
@@ -14697,6 +15159,138 @@
           </a:p>
         </p:txBody>
       </p:sp>
+      <p:sp>
+        <p:nvSpPr>
+          <p:cNvPr id="11" name="TextBox 10">
+            <a:extLst>
+              <a:ext uri="{FF2B5EF4-FFF2-40B4-BE49-F238E27FC236}">
+                <a16:creationId xmlns:a16="http://schemas.microsoft.com/office/drawing/2014/main" id="{24BB3270-CC84-7014-AB08-F8D2681DC320}"/>
+              </a:ext>
+            </a:extLst>
+          </p:cNvPr>
+          <p:cNvSpPr txBox="1"/>
+          <p:nvPr/>
+        </p:nvSpPr>
+        <p:spPr>
+          <a:xfrm>
+            <a:off x="5204406" y="-4460330"/>
+            <a:ext cx="1909497" cy="830997"/>
+          </a:xfrm>
+          <a:prstGeom prst="rect">
+            <a:avLst/>
+          </a:prstGeom>
+          <a:noFill/>
+        </p:spPr>
+        <p:txBody>
+          <a:bodyPr wrap="none" rtlCol="0">
+            <a:spAutoFit/>
+          </a:bodyPr>
+          <a:lstStyle/>
+          <a:p>
+            <a:r>
+              <a:rPr lang="en-US" sz="4800" dirty="0">
+                <a:solidFill>
+                  <a:schemeClr val="accent3">
+                    <a:lumMod val="75000"/>
+                  </a:schemeClr>
+                </a:solidFill>
+                <a:latin typeface="+mj-lt"/>
+              </a:rPr>
+              <a:t>Code</a:t>
+            </a:r>
+            <a:r>
+              <a:rPr lang="en-US" sz="4800" dirty="0">
+                <a:solidFill>
+                  <a:schemeClr val="accent3">
+                    <a:lumMod val="75000"/>
+                  </a:schemeClr>
+                </a:solidFill>
+              </a:rPr>
+              <a:t> </a:t>
+            </a:r>
+          </a:p>
+        </p:txBody>
+      </p:sp>
+      <p:sp>
+        <p:nvSpPr>
+          <p:cNvPr id="12" name="TextBox 11">
+            <a:extLst>
+              <a:ext uri="{FF2B5EF4-FFF2-40B4-BE49-F238E27FC236}">
+                <a16:creationId xmlns:a16="http://schemas.microsoft.com/office/drawing/2014/main" id="{0FAD7D26-951A-2E5A-339D-A5535358CDF0}"/>
+              </a:ext>
+            </a:extLst>
+          </p:cNvPr>
+          <p:cNvSpPr txBox="1"/>
+          <p:nvPr/>
+        </p:nvSpPr>
+        <p:spPr>
+          <a:xfrm>
+            <a:off x="3592318" y="8047610"/>
+            <a:ext cx="4799712" cy="800219"/>
+          </a:xfrm>
+          <a:prstGeom prst="rect">
+            <a:avLst/>
+          </a:prstGeom>
+          <a:noFill/>
+        </p:spPr>
+        <p:txBody>
+          <a:bodyPr wrap="none" rtlCol="0">
+            <a:spAutoFit/>
+          </a:bodyPr>
+          <a:lstStyle/>
+          <a:p>
+            <a:r>
+              <a:rPr lang="en-US" sz="2800" dirty="0">
+                <a:solidFill>
+                  <a:schemeClr val="bg1">
+                    <a:lumMod val="85000"/>
+                  </a:schemeClr>
+                </a:solidFill>
+                <a:latin typeface="+mj-lt"/>
+              </a:rPr>
+              <a:t>Head to </a:t>
+            </a:r>
+            <a:r>
+              <a:rPr lang="en-US" sz="2800" dirty="0">
+                <a:solidFill>
+                  <a:schemeClr val="tx2">
+                    <a:lumMod val="60000"/>
+                    <a:lumOff val="40000"/>
+                  </a:schemeClr>
+                </a:solidFill>
+                <a:latin typeface="+mj-lt"/>
+              </a:rPr>
+              <a:t>Vs code</a:t>
+            </a:r>
+            <a:r>
+              <a:rPr lang="en-US" sz="2800" dirty="0">
+                <a:latin typeface="+mj-lt"/>
+              </a:rPr>
+              <a:t> </a:t>
+            </a:r>
+            <a:r>
+              <a:rPr lang="en-US" sz="2800" dirty="0">
+                <a:solidFill>
+                  <a:schemeClr val="bg1">
+                    <a:lumMod val="85000"/>
+                  </a:schemeClr>
+                </a:solidFill>
+                <a:latin typeface="+mj-lt"/>
+              </a:rPr>
+              <a:t>for test !</a:t>
+            </a:r>
+            <a:r>
+              <a:rPr lang="en-US" sz="2800" dirty="0">
+                <a:latin typeface="+mj-lt"/>
+              </a:rPr>
+              <a:t>!</a:t>
+            </a:r>
+          </a:p>
+          <a:p>
+            <a:endParaRPr lang="en-US" dirty="0"/>
+          </a:p>
+        </p:txBody>
+      </p:sp>
     </p:spTree>
     <p:extLst>
       <p:ext uri="{BB962C8B-B14F-4D97-AF65-F5344CB8AC3E}">
@@ -14723,6 +15317,224 @@
 </file>
 
 <file path=ppt/slides/slide8.xml><?xml version="1.0" encoding="utf-8"?>
+<p:sld xmlns:a="http://schemas.openxmlformats.org/drawingml/2006/main" xmlns:r="http://schemas.openxmlformats.org/officeDocument/2006/relationships" xmlns:p="http://schemas.openxmlformats.org/presentationml/2006/main">
+  <p:cSld>
+    <p:spTree>
+      <p:nvGrpSpPr>
+        <p:cNvPr id="1" name=""/>
+        <p:cNvGrpSpPr/>
+        <p:nvPr/>
+      </p:nvGrpSpPr>
+      <p:grpSpPr>
+        <a:xfrm>
+          <a:off x="0" y="0"/>
+          <a:ext cx="0" cy="0"/>
+          <a:chOff x="0" y="0"/>
+          <a:chExt cx="0" cy="0"/>
+        </a:xfrm>
+      </p:grpSpPr>
+      <p:sp>
+        <p:nvSpPr>
+          <p:cNvPr id="5" name="Slide Number Placeholder 4" hidden="1">
+            <a:extLst>
+              <a:ext uri="{FF2B5EF4-FFF2-40B4-BE49-F238E27FC236}">
+                <a16:creationId xmlns:a16="http://schemas.microsoft.com/office/drawing/2014/main" id="{576B5005-C9FC-7496-C7D9-FE6529629861}"/>
+              </a:ext>
+            </a:extLst>
+          </p:cNvPr>
+          <p:cNvSpPr>
+            <a:spLocks noGrp="1"/>
+          </p:cNvSpPr>
+          <p:nvPr>
+            <p:ph type="sldNum" sz="quarter" idx="4294967295"/>
+          </p:nvPr>
+        </p:nvSpPr>
+        <p:spPr>
+          <a:xfrm>
+            <a:off x="9140971" y="6226198"/>
+            <a:ext cx="2743200" cy="365125"/>
+          </a:xfrm>
+        </p:spPr>
+        <p:txBody>
+          <a:bodyPr/>
+          <a:lstStyle/>
+          <a:p>
+            <a:pPr>
+              <a:spcAft>
+                <a:spcPts val="600"/>
+              </a:spcAft>
+            </a:pPr>
+            <a:fld id="{FE024F78-56A6-7740-B68D-8D4D026EDF3F}" type="slidenum">
+              <a:rPr lang="en-US" smtClean="0"/>
+              <a:pPr>
+                <a:spcAft>
+                  <a:spcPts val="600"/>
+                </a:spcAft>
+              </a:pPr>
+              <a:t>8</a:t>
+            </a:fld>
+            <a:endParaRPr lang="en-US"/>
+          </a:p>
+        </p:txBody>
+      </p:sp>
+      <p:sp>
+        <p:nvSpPr>
+          <p:cNvPr id="8" name="TextBox 7">
+            <a:extLst>
+              <a:ext uri="{FF2B5EF4-FFF2-40B4-BE49-F238E27FC236}">
+                <a16:creationId xmlns:a16="http://schemas.microsoft.com/office/drawing/2014/main" id="{F218B6E5-EBE7-9810-EFB0-D1D8DBD75B1D}"/>
+              </a:ext>
+            </a:extLst>
+          </p:cNvPr>
+          <p:cNvSpPr txBox="1"/>
+          <p:nvPr/>
+        </p:nvSpPr>
+        <p:spPr>
+          <a:xfrm>
+            <a:off x="5182128" y="2872847"/>
+            <a:ext cx="1909497" cy="830997"/>
+          </a:xfrm>
+          <a:prstGeom prst="rect">
+            <a:avLst/>
+          </a:prstGeom>
+          <a:noFill/>
+        </p:spPr>
+        <p:txBody>
+          <a:bodyPr wrap="none" rtlCol="0">
+            <a:spAutoFit/>
+          </a:bodyPr>
+          <a:lstStyle/>
+          <a:p>
+            <a:r>
+              <a:rPr lang="en-US" sz="4800" dirty="0">
+                <a:solidFill>
+                  <a:schemeClr val="accent3">
+                    <a:lumMod val="75000"/>
+                  </a:schemeClr>
+                </a:solidFill>
+                <a:latin typeface="+mj-lt"/>
+              </a:rPr>
+              <a:t>Code</a:t>
+            </a:r>
+            <a:r>
+              <a:rPr lang="en-US" sz="4800" dirty="0">
+                <a:solidFill>
+                  <a:schemeClr val="accent3">
+                    <a:lumMod val="75000"/>
+                  </a:schemeClr>
+                </a:solidFill>
+              </a:rPr>
+              <a:t> </a:t>
+            </a:r>
+          </a:p>
+        </p:txBody>
+      </p:sp>
+      <p:sp>
+        <p:nvSpPr>
+          <p:cNvPr id="11" name="TextBox 10">
+            <a:extLst>
+              <a:ext uri="{FF2B5EF4-FFF2-40B4-BE49-F238E27FC236}">
+                <a16:creationId xmlns:a16="http://schemas.microsoft.com/office/drawing/2014/main" id="{ED248CE0-4CE5-C2D0-6CE8-BE2C0C772925}"/>
+              </a:ext>
+            </a:extLst>
+          </p:cNvPr>
+          <p:cNvSpPr txBox="1"/>
+          <p:nvPr/>
+        </p:nvSpPr>
+        <p:spPr>
+          <a:xfrm>
+            <a:off x="4089585" y="3623094"/>
+            <a:ext cx="4799712" cy="800219"/>
+          </a:xfrm>
+          <a:prstGeom prst="rect">
+            <a:avLst/>
+          </a:prstGeom>
+          <a:noFill/>
+        </p:spPr>
+        <p:txBody>
+          <a:bodyPr wrap="none" rtlCol="0">
+            <a:spAutoFit/>
+          </a:bodyPr>
+          <a:lstStyle/>
+          <a:p>
+            <a:r>
+              <a:rPr lang="en-US" sz="2800" dirty="0">
+                <a:solidFill>
+                  <a:schemeClr val="bg1">
+                    <a:lumMod val="85000"/>
+                  </a:schemeClr>
+                </a:solidFill>
+                <a:latin typeface="+mj-lt"/>
+              </a:rPr>
+              <a:t>Head to </a:t>
+            </a:r>
+            <a:r>
+              <a:rPr lang="en-US" sz="2800" dirty="0">
+                <a:solidFill>
+                  <a:schemeClr val="tx2">
+                    <a:lumMod val="60000"/>
+                    <a:lumOff val="40000"/>
+                  </a:schemeClr>
+                </a:solidFill>
+                <a:latin typeface="+mj-lt"/>
+              </a:rPr>
+              <a:t>Vs code</a:t>
+            </a:r>
+            <a:r>
+              <a:rPr lang="en-US" sz="2800" dirty="0">
+                <a:latin typeface="+mj-lt"/>
+              </a:rPr>
+              <a:t> </a:t>
+            </a:r>
+            <a:r>
+              <a:rPr lang="en-US" sz="2800" dirty="0">
+                <a:solidFill>
+                  <a:schemeClr val="bg1">
+                    <a:lumMod val="85000"/>
+                  </a:schemeClr>
+                </a:solidFill>
+                <a:latin typeface="+mj-lt"/>
+              </a:rPr>
+              <a:t>for test !</a:t>
+            </a:r>
+            <a:r>
+              <a:rPr lang="en-US" sz="2800" dirty="0">
+                <a:latin typeface="+mj-lt"/>
+              </a:rPr>
+              <a:t>!</a:t>
+            </a:r>
+          </a:p>
+          <a:p>
+            <a:endParaRPr lang="en-US" dirty="0"/>
+          </a:p>
+        </p:txBody>
+      </p:sp>
+    </p:spTree>
+    <p:extLst>
+      <p:ext uri="{BB962C8B-B14F-4D97-AF65-F5344CB8AC3E}">
+        <p14:creationId xmlns:p14="http://schemas.microsoft.com/office/powerpoint/2010/main" val="4250544087"/>
+      </p:ext>
+    </p:extLst>
+  </p:cSld>
+  <p:clrMapOvr>
+    <a:masterClrMapping/>
+  </p:clrMapOvr>
+  <mc:AlternateContent xmlns:mc="http://schemas.openxmlformats.org/markup-compatibility/2006">
+    <mc:Choice xmlns:p159="http://schemas.microsoft.com/office/powerpoint/2015/09/main" Requires="p159">
+      <p:transition xmlns:p14="http://schemas.microsoft.com/office/powerpoint/2010/main" spd="slow" p14:dur="2000">
+        <p159:morph option="byObject"/>
+      </p:transition>
+    </mc:Choice>
+    <mc:Fallback>
+      <p:transition spd="slow">
+        <p:fade/>
+      </p:transition>
+    </mc:Fallback>
+  </mc:AlternateContent>
+</p:sld>
+</file>
+
+<file path=ppt/slides/slide9.xml><?xml version="1.0" encoding="utf-8"?>
 <p:sld xmlns:a="http://schemas.openxmlformats.org/drawingml/2006/main" xmlns:r="http://schemas.openxmlformats.org/officeDocument/2006/relationships" xmlns:p="http://schemas.openxmlformats.org/presentationml/2006/main">
   <p:cSld>
     <p:spTree>
@@ -14802,7 +15614,7 @@
             <a:fld id="{FE024F78-56A6-7740-B68D-8D4D026EDF3F}" type="slidenum">
               <a:rPr lang="en-US" smtClean="0"/>
               <a:pPr/>
-              <a:t>8</a:t>
+              <a:t>9</a:t>
             </a:fld>
             <a:endParaRPr lang="en-US" dirty="0"/>
           </a:p>
@@ -15062,466 +15874,6 @@
     <p:extLst>
       <p:ext uri="{BB962C8B-B14F-4D97-AF65-F5344CB8AC3E}">
         <p14:creationId xmlns:p14="http://schemas.microsoft.com/office/powerpoint/2010/main" val="755259674"/>
-      </p:ext>
-    </p:extLst>
-  </p:cSld>
-  <p:clrMapOvr>
-    <a:masterClrMapping/>
-  </p:clrMapOvr>
-  <mc:AlternateContent xmlns:mc="http://schemas.openxmlformats.org/markup-compatibility/2006" xmlns:p159="http://schemas.microsoft.com/office/powerpoint/2015/09/main">
-    <mc:Choice Requires="p159">
-      <p:transition xmlns:p14="http://schemas.microsoft.com/office/powerpoint/2010/main" spd="slow" p14:dur="2000">
-        <p159:morph option="byObject"/>
-      </p:transition>
-    </mc:Choice>
-    <mc:Fallback xmlns="">
-      <p:transition spd="slow">
-        <p:fade/>
-      </p:transition>
-    </mc:Fallback>
-  </mc:AlternateContent>
-</p:sld>
-</file>
-
-<file path=ppt/slides/slide9.xml><?xml version="1.0" encoding="utf-8"?>
-<p:sld xmlns:a="http://schemas.openxmlformats.org/drawingml/2006/main" xmlns:r="http://schemas.openxmlformats.org/officeDocument/2006/relationships" xmlns:p="http://schemas.openxmlformats.org/presentationml/2006/main">
-  <p:cSld>
-    <p:spTree>
-      <p:nvGrpSpPr>
-        <p:cNvPr id="1" name=""/>
-        <p:cNvGrpSpPr/>
-        <p:nvPr/>
-      </p:nvGrpSpPr>
-      <p:grpSpPr>
-        <a:xfrm>
-          <a:off x="0" y="0"/>
-          <a:ext cx="0" cy="0"/>
-          <a:chOff x="0" y="0"/>
-          <a:chExt cx="0" cy="0"/>
-        </a:xfrm>
-      </p:grpSpPr>
-      <p:sp>
-        <p:nvSpPr>
-          <p:cNvPr id="3" name="Content Placeholder 2">
-            <a:extLst>
-              <a:ext uri="{FF2B5EF4-FFF2-40B4-BE49-F238E27FC236}">
-                <a16:creationId xmlns:a16="http://schemas.microsoft.com/office/drawing/2014/main" id="{F09FEE91-E849-1CB0-9E51-A58B99C631C5}"/>
-              </a:ext>
-            </a:extLst>
-          </p:cNvPr>
-          <p:cNvSpPr>
-            <a:spLocks noGrp="1"/>
-          </p:cNvSpPr>
-          <p:nvPr>
-            <p:ph sz="quarter" idx="35"/>
-          </p:nvPr>
-        </p:nvSpPr>
-        <p:spPr>
-          <a:xfrm>
-            <a:off x="2252542" y="2302283"/>
-            <a:ext cx="4015098" cy="3528397"/>
-          </a:xfrm>
-        </p:spPr>
-        <p:txBody>
-          <a:bodyPr/>
-          <a:lstStyle/>
-          <a:p>
-            <a:r>
-              <a:rPr lang="en-US" sz="2400" dirty="0">
-                <a:solidFill>
-                  <a:schemeClr val="tx2"/>
-                </a:solidFill>
-              </a:rPr>
-              <a:t>Advantages:</a:t>
-            </a:r>
-          </a:p>
-          <a:p>
-            <a:pPr marL="285750" indent="-285750">
-              <a:buFont typeface="Arial" panose="020B0604020202020204" pitchFamily="34" charset="0"/>
-              <a:buChar char="•"/>
-            </a:pPr>
-            <a:r>
-              <a:rPr lang="en-US" dirty="0"/>
-              <a:t>Simplicity: FCFS is easy to implement and understand.</a:t>
-            </a:r>
-          </a:p>
-          <a:p>
-            <a:pPr marL="285750" indent="-285750">
-              <a:buFont typeface="Arial" panose="020B0604020202020204" pitchFamily="34" charset="0"/>
-              <a:buChar char="•"/>
-            </a:pPr>
-            <a:r>
-              <a:rPr lang="en-US" dirty="0"/>
-              <a:t>Predictable: The order of process execution is predictable.</a:t>
-            </a:r>
-          </a:p>
-        </p:txBody>
-      </p:sp>
-      <p:sp>
-        <p:nvSpPr>
-          <p:cNvPr id="4" name="Content Placeholder 3">
-            <a:extLst>
-              <a:ext uri="{FF2B5EF4-FFF2-40B4-BE49-F238E27FC236}">
-                <a16:creationId xmlns:a16="http://schemas.microsoft.com/office/drawing/2014/main" id="{9B774F1A-D233-C240-B22D-F82C6161FAC1}"/>
-              </a:ext>
-            </a:extLst>
-          </p:cNvPr>
-          <p:cNvSpPr>
-            <a:spLocks noGrp="1"/>
-          </p:cNvSpPr>
-          <p:nvPr>
-            <p:ph sz="quarter" idx="36"/>
-          </p:nvPr>
-        </p:nvSpPr>
-        <p:spPr>
-          <a:xfrm>
-            <a:off x="6995159" y="2327192"/>
-            <a:ext cx="4227332" cy="3951868"/>
-          </a:xfrm>
-        </p:spPr>
-        <p:txBody>
-          <a:bodyPr/>
-          <a:lstStyle/>
-          <a:p>
-            <a:r>
-              <a:rPr lang="en-US" sz="2400" dirty="0">
-                <a:solidFill>
-                  <a:schemeClr val="tx2"/>
-                </a:solidFill>
-              </a:rPr>
-              <a:t>Disadvantages</a:t>
-            </a:r>
-            <a:r>
-              <a:rPr lang="en-US" sz="2000" b="1" dirty="0">
-                <a:solidFill>
-                  <a:schemeClr val="tx2"/>
-                </a:solidFill>
-              </a:rPr>
-              <a:t>:</a:t>
-            </a:r>
-          </a:p>
-          <a:p>
-            <a:pPr marL="285750" indent="-285750">
-              <a:buFont typeface="Arial" panose="020B0604020202020204" pitchFamily="34" charset="0"/>
-              <a:buChar char="•"/>
-            </a:pPr>
-            <a:r>
-              <a:rPr lang="en-US" dirty="0"/>
-              <a:t>Convoy Effect: A long process can delay many shorter processes, leading to increased waiting times.</a:t>
-            </a:r>
-          </a:p>
-          <a:p>
-            <a:pPr marL="285750" indent="-285750">
-              <a:buFont typeface="Arial" panose="020B0604020202020204" pitchFamily="34" charset="0"/>
-              <a:buChar char="•"/>
-            </a:pPr>
-            <a:r>
-              <a:rPr lang="en-US" dirty="0"/>
-              <a:t>Poor Average Waiting Time: High average waiting time when there is significant variation in burst times.</a:t>
-            </a:r>
-          </a:p>
-          <a:p>
-            <a:pPr marL="285750" indent="-285750">
-              <a:buFont typeface="Arial" panose="020B0604020202020204" pitchFamily="34" charset="0"/>
-              <a:buChar char="•"/>
-            </a:pPr>
-            <a:r>
-              <a:rPr lang="en-US" dirty="0"/>
-              <a:t>Non-Preemptive: Inefficient for time-sharing systems where response time is crucial</a:t>
-            </a:r>
-          </a:p>
-          <a:p>
-            <a:pPr lvl="1"/>
-            <a:endParaRPr lang="en-US" dirty="0"/>
-          </a:p>
-        </p:txBody>
-      </p:sp>
-      <p:sp>
-        <p:nvSpPr>
-          <p:cNvPr id="5" name="Slide Number Placeholder 4">
-            <a:extLst>
-              <a:ext uri="{FF2B5EF4-FFF2-40B4-BE49-F238E27FC236}">
-                <a16:creationId xmlns:a16="http://schemas.microsoft.com/office/drawing/2014/main" id="{23E23533-91C6-420C-B7D7-4977ACF73ACF}"/>
-              </a:ext>
-            </a:extLst>
-          </p:cNvPr>
-          <p:cNvSpPr>
-            <a:spLocks noGrp="1"/>
-          </p:cNvSpPr>
-          <p:nvPr>
-            <p:ph type="sldNum" sz="quarter" idx="12"/>
-          </p:nvPr>
-        </p:nvSpPr>
-        <p:spPr>
-          <a:xfrm>
-            <a:off x="9140971" y="6226198"/>
-            <a:ext cx="2743200" cy="365125"/>
-          </a:xfrm>
-        </p:spPr>
-        <p:txBody>
-          <a:bodyPr/>
-          <a:lstStyle/>
-          <a:p>
-            <a:fld id="{FE024F78-56A6-7740-B68D-8D4D026EDF3F}" type="slidenum">
-              <a:rPr lang="en-US" smtClean="0"/>
-              <a:pPr/>
-              <a:t>9</a:t>
-            </a:fld>
-            <a:endParaRPr lang="en-US" dirty="0"/>
-          </a:p>
-        </p:txBody>
-      </p:sp>
-      <p:sp>
-        <p:nvSpPr>
-          <p:cNvPr id="8" name="Subtitle 4">
-            <a:extLst>
-              <a:ext uri="{FF2B5EF4-FFF2-40B4-BE49-F238E27FC236}">
-                <a16:creationId xmlns:a16="http://schemas.microsoft.com/office/drawing/2014/main" id="{64C2F3A9-ACD4-95DF-7B87-86B79D5D329F}"/>
-              </a:ext>
-            </a:extLst>
-          </p:cNvPr>
-          <p:cNvSpPr txBox="1">
-            <a:spLocks/>
-          </p:cNvSpPr>
-          <p:nvPr/>
-        </p:nvSpPr>
-        <p:spPr>
-          <a:xfrm>
-            <a:off x="2252542" y="1434131"/>
-            <a:ext cx="5853413" cy="640757"/>
-          </a:xfrm>
-          <a:prstGeom prst="rect">
-            <a:avLst/>
-          </a:prstGeom>
-        </p:spPr>
-        <p:txBody>
-          <a:bodyPr/>
-          <a:lstStyle>
-            <a:lvl1pPr marL="0" indent="0" algn="l" defTabSz="914400" rtl="0" eaLnBrk="1" latinLnBrk="0" hangingPunct="1">
-              <a:lnSpc>
-                <a:spcPct val="90000"/>
-              </a:lnSpc>
-              <a:spcBef>
-                <a:spcPts val="1000"/>
-              </a:spcBef>
-              <a:buFont typeface="Arial" panose="020B0604020202020204" pitchFamily="34" charset="0"/>
-              <a:buNone/>
-              <a:defRPr sz="2800" kern="1200">
-                <a:solidFill>
-                  <a:schemeClr val="accent3"/>
-                </a:solidFill>
-                <a:latin typeface="+mj-lt"/>
-                <a:ea typeface="+mn-ea"/>
-                <a:cs typeface="Biome" panose="020B0503030204020804" pitchFamily="34" charset="0"/>
-              </a:defRPr>
-            </a:lvl1pPr>
-            <a:lvl2pPr marL="800100" indent="-342900" algn="l" defTabSz="914400" rtl="0" eaLnBrk="1" latinLnBrk="0" hangingPunct="1">
-              <a:lnSpc>
-                <a:spcPct val="90000"/>
-              </a:lnSpc>
-              <a:spcBef>
-                <a:spcPts val="500"/>
-              </a:spcBef>
-              <a:buClr>
-                <a:schemeClr val="accent6"/>
-              </a:buClr>
-              <a:buFont typeface="Arial" panose="020B0604020202020204" pitchFamily="34" charset="0"/>
-              <a:buChar char="•"/>
-              <a:defRPr sz="2400" kern="1200">
-                <a:solidFill>
-                  <a:schemeClr val="bg1"/>
-                </a:solidFill>
-                <a:latin typeface="+mn-lt"/>
-                <a:ea typeface="+mn-ea"/>
-                <a:cs typeface="+mn-cs"/>
-              </a:defRPr>
-            </a:lvl2pPr>
-            <a:lvl3pPr marL="1257300" indent="-342900" algn="l" defTabSz="914400" rtl="0" eaLnBrk="1" latinLnBrk="0" hangingPunct="1">
-              <a:lnSpc>
-                <a:spcPct val="90000"/>
-              </a:lnSpc>
-              <a:spcBef>
-                <a:spcPts val="500"/>
-              </a:spcBef>
-              <a:buClr>
-                <a:schemeClr val="accent6"/>
-              </a:buClr>
-              <a:buFont typeface="Arial" panose="020B0604020202020204" pitchFamily="34" charset="0"/>
-              <a:buChar char="•"/>
-              <a:defRPr sz="2000" kern="1200">
-                <a:solidFill>
-                  <a:schemeClr val="bg1"/>
-                </a:solidFill>
-                <a:latin typeface="+mn-lt"/>
-                <a:ea typeface="+mn-ea"/>
-                <a:cs typeface="+mn-cs"/>
-              </a:defRPr>
-            </a:lvl3pPr>
-            <a:lvl4pPr marL="1657350" indent="-285750" algn="l" defTabSz="914400" rtl="0" eaLnBrk="1" latinLnBrk="0" hangingPunct="1">
-              <a:lnSpc>
-                <a:spcPct val="90000"/>
-              </a:lnSpc>
-              <a:spcBef>
-                <a:spcPts val="500"/>
-              </a:spcBef>
-              <a:buClr>
-                <a:schemeClr val="accent6"/>
-              </a:buClr>
-              <a:buFont typeface="Arial" panose="020B0604020202020204" pitchFamily="34" charset="0"/>
-              <a:buChar char="•"/>
-              <a:defRPr sz="1800" kern="1200">
-                <a:solidFill>
-                  <a:schemeClr val="bg1"/>
-                </a:solidFill>
-                <a:latin typeface="+mn-lt"/>
-                <a:ea typeface="+mn-ea"/>
-                <a:cs typeface="+mn-cs"/>
-              </a:defRPr>
-            </a:lvl4pPr>
-            <a:lvl5pPr marL="2114550" indent="-285750" algn="l" defTabSz="914400" rtl="0" eaLnBrk="1" latinLnBrk="0" hangingPunct="1">
-              <a:lnSpc>
-                <a:spcPct val="90000"/>
-              </a:lnSpc>
-              <a:spcBef>
-                <a:spcPts val="500"/>
-              </a:spcBef>
-              <a:buClr>
-                <a:schemeClr val="accent6"/>
-              </a:buClr>
-              <a:buFont typeface="Arial" panose="020B0604020202020204" pitchFamily="34" charset="0"/>
-              <a:buChar char="•"/>
-              <a:defRPr sz="1800" kern="1200">
-                <a:solidFill>
-                  <a:schemeClr val="bg1"/>
-                </a:solidFill>
-                <a:latin typeface="+mn-lt"/>
-                <a:ea typeface="+mn-ea"/>
-                <a:cs typeface="+mn-cs"/>
-              </a:defRPr>
-            </a:lvl5pPr>
-            <a:lvl6pPr marL="2514600" indent="-228600" algn="l" defTabSz="914400" rtl="0" eaLnBrk="1" latinLnBrk="0" hangingPunct="1">
-              <a:lnSpc>
-                <a:spcPct val="90000"/>
-              </a:lnSpc>
-              <a:spcBef>
-                <a:spcPts val="500"/>
-              </a:spcBef>
-              <a:buFont typeface="Arial" panose="020B0604020202020204" pitchFamily="34" charset="0"/>
-              <a:buChar char="•"/>
-              <a:defRPr sz="1800" kern="1200">
-                <a:solidFill>
-                  <a:schemeClr val="tx1"/>
-                </a:solidFill>
-                <a:latin typeface="+mn-lt"/>
-                <a:ea typeface="+mn-ea"/>
-                <a:cs typeface="+mn-cs"/>
-              </a:defRPr>
-            </a:lvl6pPr>
-            <a:lvl7pPr marL="2971800" indent="-228600" algn="l" defTabSz="914400" rtl="0" eaLnBrk="1" latinLnBrk="0" hangingPunct="1">
-              <a:lnSpc>
-                <a:spcPct val="90000"/>
-              </a:lnSpc>
-              <a:spcBef>
-                <a:spcPts val="500"/>
-              </a:spcBef>
-              <a:buFont typeface="Arial" panose="020B0604020202020204" pitchFamily="34" charset="0"/>
-              <a:buChar char="•"/>
-              <a:defRPr sz="1800" kern="1200">
-                <a:solidFill>
-                  <a:schemeClr val="tx1"/>
-                </a:solidFill>
-                <a:latin typeface="+mn-lt"/>
-                <a:ea typeface="+mn-ea"/>
-                <a:cs typeface="+mn-cs"/>
-              </a:defRPr>
-            </a:lvl7pPr>
-            <a:lvl8pPr marL="3429000" indent="-228600" algn="l" defTabSz="914400" rtl="0" eaLnBrk="1" latinLnBrk="0" hangingPunct="1">
-              <a:lnSpc>
-                <a:spcPct val="90000"/>
-              </a:lnSpc>
-              <a:spcBef>
-                <a:spcPts val="500"/>
-              </a:spcBef>
-              <a:buFont typeface="Arial" panose="020B0604020202020204" pitchFamily="34" charset="0"/>
-              <a:buChar char="•"/>
-              <a:defRPr sz="1800" kern="1200">
-                <a:solidFill>
-                  <a:schemeClr val="tx1"/>
-                </a:solidFill>
-                <a:latin typeface="+mn-lt"/>
-                <a:ea typeface="+mn-ea"/>
-                <a:cs typeface="+mn-cs"/>
-              </a:defRPr>
-            </a:lvl8pPr>
-            <a:lvl9pPr marL="3886200" indent="-228600" algn="l" defTabSz="914400" rtl="0" eaLnBrk="1" latinLnBrk="0" hangingPunct="1">
-              <a:lnSpc>
-                <a:spcPct val="90000"/>
-              </a:lnSpc>
-              <a:spcBef>
-                <a:spcPts val="500"/>
-              </a:spcBef>
-              <a:buFont typeface="Arial" panose="020B0604020202020204" pitchFamily="34" charset="0"/>
-              <a:buChar char="•"/>
-              <a:defRPr sz="1800" kern="1200">
-                <a:solidFill>
-                  <a:schemeClr val="tx1"/>
-                </a:solidFill>
-                <a:latin typeface="+mn-lt"/>
-                <a:ea typeface="+mn-ea"/>
-                <a:cs typeface="+mn-cs"/>
-              </a:defRPr>
-            </a:lvl9pPr>
-          </a:lstStyle>
-          <a:p>
-            <a:r>
-              <a:rPr lang="en-US" dirty="0"/>
-              <a:t>Advantages and Disadvantages</a:t>
-            </a:r>
-          </a:p>
-        </p:txBody>
-      </p:sp>
-      <p:sp>
-        <p:nvSpPr>
-          <p:cNvPr id="9" name="Title 1">
-            <a:extLst>
-              <a:ext uri="{FF2B5EF4-FFF2-40B4-BE49-F238E27FC236}">
-                <a16:creationId xmlns:a16="http://schemas.microsoft.com/office/drawing/2014/main" id="{B0FCD022-DA6A-7B0B-B003-A6B7164DD2FD}"/>
-              </a:ext>
-            </a:extLst>
-          </p:cNvPr>
-          <p:cNvSpPr>
-            <a:spLocks noGrp="1"/>
-          </p:cNvSpPr>
-          <p:nvPr>
-            <p:ph type="title"/>
-          </p:nvPr>
-        </p:nvSpPr>
-        <p:spPr>
-          <a:xfrm>
-            <a:off x="2252542" y="-2047773"/>
-            <a:ext cx="7420819" cy="1656304"/>
-          </a:xfrm>
-        </p:spPr>
-        <p:txBody>
-          <a:bodyPr anchor="b">
-            <a:normAutofit/>
-          </a:bodyPr>
-          <a:lstStyle/>
-          <a:p>
-            <a:r>
-              <a:rPr lang="en-US" dirty="0">
-                <a:effectLst/>
-              </a:rPr>
-              <a:t>Conclusion</a:t>
-            </a:r>
-            <a:endParaRPr lang="en-US" dirty="0"/>
-          </a:p>
-        </p:txBody>
-      </p:sp>
-    </p:spTree>
-    <p:extLst>
-      <p:ext uri="{BB962C8B-B14F-4D97-AF65-F5344CB8AC3E}">
-        <p14:creationId xmlns:p14="http://schemas.microsoft.com/office/powerpoint/2010/main" val="1073601555"/>
       </p:ext>
     </p:extLst>
   </p:cSld>
@@ -16335,15 +16687,6 @@
 </file>
 
 <file path=customXml/item1.xml><?xml version="1.0" encoding="utf-8"?>
-<?mso-contentType ?>
-<FormTemplates xmlns="http://schemas.microsoft.com/sharepoint/v3/contenttype/forms">
-  <Display>DocumentLibraryForm</Display>
-  <Edit>DocumentLibraryForm</Edit>
-  <New>DocumentLibraryForm</New>
-</FormTemplates>
-</file>
-
-<file path=customXml/item2.xml><?xml version="1.0" encoding="utf-8"?>
 <p:properties xmlns:p="http://schemas.microsoft.com/office/2006/metadata/properties" xmlns:xsi="http://www.w3.org/2001/XMLSchema-instance" xmlns:pc="http://schemas.microsoft.com/office/infopath/2007/PartnerControls">
   <documentManagement>
     <_ip_UnifiedCompliancePolicyUIAction xmlns="http://schemas.microsoft.com/sharepoint/v3" xsi:nil="true"/>
@@ -16361,6 +16704,15 @@
     <MediaServiceKeyPoints xmlns="71af3243-3dd4-4a8d-8c0d-dd76da1f02a5" xsi:nil="true"/>
   </documentManagement>
 </p:properties>
+</file>
+
+<file path=customXml/item2.xml><?xml version="1.0" encoding="utf-8"?>
+<?mso-contentType ?>
+<FormTemplates xmlns="http://schemas.microsoft.com/sharepoint/v3/contenttype/forms">
+  <Display>DocumentLibraryForm</Display>
+  <Edit>DocumentLibraryForm</Edit>
+  <New>DocumentLibraryForm</New>
+</FormTemplates>
 </file>
 
 <file path=customXml/item3.xml><?xml version="1.0" encoding="utf-8"?>
@@ -16676,14 +17028,6 @@
 </file>
 
 <file path=customXml/itemProps1.xml><?xml version="1.0" encoding="utf-8"?>
-<ds:datastoreItem xmlns:ds="http://schemas.openxmlformats.org/officeDocument/2006/customXml" ds:itemID="{44137456-21FC-4AE2-8A94-BF06CAF2EB9B}">
-  <ds:schemaRefs>
-    <ds:schemaRef ds:uri="http://schemas.microsoft.com/sharepoint/v3/contenttype/forms"/>
-  </ds:schemaRefs>
-</ds:datastoreItem>
-</file>
-
-<file path=customXml/itemProps2.xml><?xml version="1.0" encoding="utf-8"?>
 <ds:datastoreItem xmlns:ds="http://schemas.openxmlformats.org/officeDocument/2006/customXml" ds:itemID="{E305301E-11B3-4B9D-A588-21F3C9809371}">
   <ds:schemaRefs>
     <ds:schemaRef ds:uri="http://schemas.microsoft.com/office/2006/metadata/properties"/>
@@ -16691,6 +17035,14 @@
     <ds:schemaRef ds:uri="http://schemas.microsoft.com/sharepoint/v3"/>
     <ds:schemaRef ds:uri="71af3243-3dd4-4a8d-8c0d-dd76da1f02a5"/>
     <ds:schemaRef ds:uri="230e9df3-be65-4c73-a93b-d1236ebd677e"/>
+  </ds:schemaRefs>
+</ds:datastoreItem>
+</file>
+
+<file path=customXml/itemProps2.xml><?xml version="1.0" encoding="utf-8"?>
+<ds:datastoreItem xmlns:ds="http://schemas.openxmlformats.org/officeDocument/2006/customXml" ds:itemID="{44137456-21FC-4AE2-8A94-BF06CAF2EB9B}">
+  <ds:schemaRefs>
+    <ds:schemaRef ds:uri="http://schemas.microsoft.com/sharepoint/v3/contenttype/forms"/>
   </ds:schemaRefs>
 </ds:datastoreItem>
 </file>

</xml_diff>